<commit_message>
Webservcie ASMX und AJAX
</commit_message>
<xml_diff>
--- a/15Services.pptx
+++ b/15Services.pptx
@@ -205,7 +205,7 @@
           <a:p>
             <a:fld id="{86035F98-A1BD-4CEA-97BE-8B0B3D35457A}" type="datetimeFigureOut">
               <a:rPr lang="de-DE" smtClean="0"/>
-              <a:t>02.06.2017</a:t>
+              <a:t>07.06.2018</a:t>
             </a:fld>
             <a:endParaRPr lang="de-DE"/>
           </a:p>
@@ -601,7 +601,7 @@
           <a:p>
             <a:fld id="{D92B96C3-1F42-476F-BF68-0478C74608EE}" type="datetimeFigureOut">
               <a:rPr lang="de-DE" smtClean="0"/>
-              <a:t>02.06.2017</a:t>
+              <a:t>07.06.2018</a:t>
             </a:fld>
             <a:endParaRPr lang="de-DE"/>
           </a:p>
@@ -769,7 +769,7 @@
           <a:p>
             <a:fld id="{D92B96C3-1F42-476F-BF68-0478C74608EE}" type="datetimeFigureOut">
               <a:rPr lang="de-DE" smtClean="0"/>
-              <a:t>02.06.2017</a:t>
+              <a:t>07.06.2018</a:t>
             </a:fld>
             <a:endParaRPr lang="de-DE"/>
           </a:p>
@@ -947,7 +947,7 @@
           <a:p>
             <a:fld id="{D92B96C3-1F42-476F-BF68-0478C74608EE}" type="datetimeFigureOut">
               <a:rPr lang="de-DE" smtClean="0"/>
-              <a:t>02.06.2017</a:t>
+              <a:t>07.06.2018</a:t>
             </a:fld>
             <a:endParaRPr lang="de-DE"/>
           </a:p>
@@ -1115,7 +1115,7 @@
           <a:p>
             <a:fld id="{D92B96C3-1F42-476F-BF68-0478C74608EE}" type="datetimeFigureOut">
               <a:rPr lang="de-DE" smtClean="0"/>
-              <a:t>02.06.2017</a:t>
+              <a:t>07.06.2018</a:t>
             </a:fld>
             <a:endParaRPr lang="de-DE"/>
           </a:p>
@@ -1360,7 +1360,7 @@
           <a:p>
             <a:fld id="{D92B96C3-1F42-476F-BF68-0478C74608EE}" type="datetimeFigureOut">
               <a:rPr lang="de-DE" smtClean="0"/>
-              <a:t>02.06.2017</a:t>
+              <a:t>07.06.2018</a:t>
             </a:fld>
             <a:endParaRPr lang="de-DE"/>
           </a:p>
@@ -1589,7 +1589,7 @@
           <a:p>
             <a:fld id="{D92B96C3-1F42-476F-BF68-0478C74608EE}" type="datetimeFigureOut">
               <a:rPr lang="de-DE" smtClean="0"/>
-              <a:t>02.06.2017</a:t>
+              <a:t>07.06.2018</a:t>
             </a:fld>
             <a:endParaRPr lang="de-DE"/>
           </a:p>
@@ -1953,7 +1953,7 @@
           <a:p>
             <a:fld id="{D92B96C3-1F42-476F-BF68-0478C74608EE}" type="datetimeFigureOut">
               <a:rPr lang="de-DE" smtClean="0"/>
-              <a:t>02.06.2017</a:t>
+              <a:t>07.06.2018</a:t>
             </a:fld>
             <a:endParaRPr lang="de-DE"/>
           </a:p>
@@ -2070,7 +2070,7 @@
           <a:p>
             <a:fld id="{D92B96C3-1F42-476F-BF68-0478C74608EE}" type="datetimeFigureOut">
               <a:rPr lang="de-DE" smtClean="0"/>
-              <a:t>02.06.2017</a:t>
+              <a:t>07.06.2018</a:t>
             </a:fld>
             <a:endParaRPr lang="de-DE"/>
           </a:p>
@@ -2165,7 +2165,7 @@
           <a:p>
             <a:fld id="{D92B96C3-1F42-476F-BF68-0478C74608EE}" type="datetimeFigureOut">
               <a:rPr lang="de-DE" smtClean="0"/>
-              <a:t>02.06.2017</a:t>
+              <a:t>07.06.2018</a:t>
             </a:fld>
             <a:endParaRPr lang="de-DE"/>
           </a:p>
@@ -2440,7 +2440,7 @@
           <a:p>
             <a:fld id="{D92B96C3-1F42-476F-BF68-0478C74608EE}" type="datetimeFigureOut">
               <a:rPr lang="de-DE" smtClean="0"/>
-              <a:t>02.06.2017</a:t>
+              <a:t>07.06.2018</a:t>
             </a:fld>
             <a:endParaRPr lang="de-DE"/>
           </a:p>
@@ -2692,7 +2692,7 @@
           <a:p>
             <a:fld id="{D92B96C3-1F42-476F-BF68-0478C74608EE}" type="datetimeFigureOut">
               <a:rPr lang="de-DE" smtClean="0"/>
-              <a:t>02.06.2017</a:t>
+              <a:t>07.06.2018</a:t>
             </a:fld>
             <a:endParaRPr lang="de-DE"/>
           </a:p>
@@ -2903,7 +2903,7 @@
           <a:p>
             <a:fld id="{D92B96C3-1F42-476F-BF68-0478C74608EE}" type="datetimeFigureOut">
               <a:rPr lang="de-DE" smtClean="0"/>
-              <a:t>02.06.2017</a:t>
+              <a:t>07.06.2018</a:t>
             </a:fld>
             <a:endParaRPr lang="de-DE"/>
           </a:p>
@@ -3498,8 +3498,13 @@
           <a:p>
             <a:r>
               <a:rPr lang="de-DE" dirty="0" smtClean="0"/>
-              <a:t>Statuslos</a:t>
-            </a:r>
+              <a:t>Statuslos URI </a:t>
+            </a:r>
+            <a:r>
+              <a:rPr lang="de-DE" smtClean="0"/>
+              <a:t>als Endpunkt</a:t>
+            </a:r>
+            <a:endParaRPr lang="de-DE" dirty="0" smtClean="0"/>
           </a:p>
           <a:p>
             <a:r>
@@ -3512,8 +3517,20 @@
             </a:r>
             <a:r>
               <a:rPr lang="de-DE" dirty="0" smtClean="0"/>
-              <a:t> DB Methoden</a:t>
-            </a:r>
+              <a:t> DB </a:t>
+            </a:r>
+            <a:r>
+              <a:rPr lang="de-DE" dirty="0" smtClean="0"/>
+              <a:t>Methoden</a:t>
+            </a:r>
+          </a:p>
+          <a:p>
+            <a:pPr lvl="1"/>
+            <a:r>
+              <a:rPr lang="de-DE" dirty="0" smtClean="0"/>
+              <a:t>CRUD -&gt;Insert, Select, Update, Delete-&gt; POST, GET,PUT, DELETE</a:t>
+            </a:r>
+            <a:endParaRPr lang="de-DE" dirty="0" smtClean="0"/>
           </a:p>
           <a:p>
             <a:r>

</xml_diff>